<commit_message>
Update 2022180032 이재준 2DGP-1차발표자료.pptx
</commit_message>
<xml_diff>
--- a/project_1/2022180032 이재준 2DGP-1차발표자료.pptx
+++ b/project_1/2022180032 이재준 2DGP-1차발표자료.pptx
@@ -1,8 +1,8 @@
 
 <file path=ppt/presentation.xml><?xml version="1.0" encoding="utf-8"?>
-<p:presentation xmlns:a="http://schemas.openxmlformats.org/drawingml/2006/main" xmlns:r="http://schemas.openxmlformats.org/officeDocument/2006/relationships" xmlns:p="http://schemas.openxmlformats.org/presentationml/2006/main" saveSubsetFonts="1">
+<p:presentation xmlns:r="http://schemas.openxmlformats.org/officeDocument/2006/relationships" xmlns:c="http://schemas.openxmlformats.org/drawingml/2006/chart" xmlns:a="http://schemas.openxmlformats.org/drawingml/2006/main" xmlns:dgm="http://schemas.openxmlformats.org/drawingml/2006/diagram" xmlns:dsp="http://schemas.microsoft.com/office/drawing/2008/diagram" xmlns:p="http://schemas.openxmlformats.org/presentationml/2006/main">
   <p:sldMasterIdLst>
-    <p:sldMasterId id="2147483648" r:id="rId1"/>
+    <p:sldMasterId id="2147483662" r:id="rId1"/>
   </p:sldMasterIdLst>
   <p:sldIdLst>
     <p:sldId id="256" r:id="rId2"/>
@@ -11,6 +11,15 @@
     <p:sldId id="258" r:id="rId5"/>
     <p:sldId id="259" r:id="rId6"/>
     <p:sldId id="261" r:id="rId7"/>
+    <p:sldId id="262" r:id="rId8"/>
+    <p:sldId id="263" r:id="rId9"/>
+    <p:sldId id="264" r:id="rId10"/>
+    <p:sldId id="265" r:id="rId11"/>
+    <p:sldId id="266" r:id="rId12"/>
+    <p:sldId id="267" r:id="rId13"/>
+    <p:sldId id="268" r:id="rId14"/>
+    <p:sldId id="269" r:id="rId15"/>
+    <p:sldId id="270" r:id="rId16"/>
   </p:sldIdLst>
   <p:sldSz cx="12192000" cy="6858000"/>
   <p:notesSz cx="6858000" cy="9144000"/>
@@ -3036,6 +3045,858 @@
 </p:sld>
 </file>
 
+<file path=ppt/slides/slide10.xml><?xml version="1.0" encoding="utf-8"?>
+<p:sld xmlns:r="http://schemas.openxmlformats.org/officeDocument/2006/relationships" xmlns:c="http://schemas.openxmlformats.org/drawingml/2006/chart" xmlns:a="http://schemas.openxmlformats.org/drawingml/2006/main" xmlns:dgm="http://schemas.openxmlformats.org/drawingml/2006/diagram" xmlns:dsp="http://schemas.microsoft.com/office/drawing/2008/diagram" xmlns:p="http://schemas.openxmlformats.org/presentationml/2006/main">
+  <p:cSld>
+    <p:spTree>
+      <p:nvGrpSpPr>
+        <p:cNvPr id="1" name=""/>
+        <p:cNvGrpSpPr/>
+        <p:nvPr/>
+      </p:nvGrpSpPr>
+      <p:grpSpPr>
+        <a:xfrm>
+          <a:off x="0" y="0"/>
+          <a:ext cx="0" cy="0"/>
+          <a:chOff x="0" y="0"/>
+          <a:chExt cx="0" cy="0"/>
+        </a:xfrm>
+      </p:grpSpPr>
+      <p:sp>
+        <p:nvSpPr>
+          <p:cNvPr id="2" name="제목 1"/>
+          <p:cNvSpPr>
+            <a:spLocks noGrp="1"/>
+          </p:cNvSpPr>
+          <p:nvPr>
+            <p:ph type="title" idx="0"/>
+          </p:nvPr>
+        </p:nvSpPr>
+        <p:spPr/>
+        <p:txBody>
+          <a:bodyPr/>
+          <a:lstStyle/>
+          <a:p>
+            <a:pPr algn="ctr">
+              <a:defRPr/>
+            </a:pPr>
+            <a:r>
+              <a:rPr lang="ko-KR" altLang="en-US"/>
+              <a:t>게임 기획서</a:t>
+            </a:r>
+            <a:endParaRPr lang="ko-KR" altLang="en-US"/>
+          </a:p>
+        </p:txBody>
+      </p:sp>
+      <p:sp>
+        <p:nvSpPr>
+          <p:cNvPr id="3" name="내용 개체 틀 2"/>
+          <p:cNvSpPr>
+            <a:spLocks noGrp="1"/>
+          </p:cNvSpPr>
+          <p:nvPr>
+            <p:ph idx="1"/>
+          </p:nvPr>
+        </p:nvSpPr>
+        <p:spPr/>
+        <p:txBody>
+          <a:bodyPr>
+            <a:normAutofit lnSpcReduction="10000"/>
+          </a:bodyPr>
+          <a:lstStyle/>
+          <a:p>
+            <a:pPr>
+              <a:defRPr/>
+            </a:pPr>
+            <a:r>
+              <a:rPr lang="ko-KR" altLang="en-US"/>
+              <a:t>4. 게임 플레이</a:t>
+            </a:r>
+            <a:endParaRPr lang="ko-KR" altLang="en-US"/>
+          </a:p>
+          <a:p>
+            <a:pPr>
+              <a:defRPr/>
+            </a:pPr>
+            <a:endParaRPr lang="ko-KR" altLang="en-US"/>
+          </a:p>
+          <a:p>
+            <a:pPr marL="0" indent="0">
+              <a:buNone/>
+              <a:defRPr/>
+            </a:pPr>
+            <a:r>
+              <a:rPr lang="ko-KR" altLang="en-US" b="1"/>
+              <a:t>아이템</a:t>
+            </a:r>
+            <a:endParaRPr lang="ko-KR" altLang="en-US" b="1"/>
+          </a:p>
+          <a:p>
+            <a:pPr marL="0" indent="0">
+              <a:buNone/>
+              <a:defRPr/>
+            </a:pPr>
+            <a:endParaRPr lang="ko-KR" altLang="en-US" b="1"/>
+          </a:p>
+          <a:p>
+            <a:pPr marL="0" indent="0">
+              <a:buNone/>
+              <a:defRPr/>
+            </a:pPr>
+            <a:r>
+              <a:rPr lang="ko-KR" altLang="en-US"/>
+              <a:t>슈퍼 버섯: 마리오가 커지며 한 번의 공격을 버틸 수 있다.</a:t>
+            </a:r>
+            <a:endParaRPr lang="ko-KR" altLang="en-US"/>
+          </a:p>
+          <a:p>
+            <a:pPr marL="0" indent="0">
+              <a:buNone/>
+              <a:defRPr/>
+            </a:pPr>
+            <a:r>
+              <a:rPr lang="ko-KR" altLang="en-US"/>
+              <a:t>파이어 플라워: 마리오가 파이어 마리오로 변신해 파이어볼을 던질 수 있다.</a:t>
+            </a:r>
+            <a:endParaRPr lang="ko-KR" altLang="en-US"/>
+          </a:p>
+          <a:p>
+            <a:pPr marL="0" indent="0">
+              <a:buNone/>
+              <a:defRPr/>
+            </a:pPr>
+            <a:r>
+              <a:rPr lang="ko-KR" altLang="en-US"/>
+              <a:t>스타: 일정 시간 동안 무적 상태가 된다.</a:t>
+            </a:r>
+            <a:endParaRPr lang="ko-KR" altLang="en-US"/>
+          </a:p>
+          <a:p>
+            <a:pPr marL="0" indent="0">
+              <a:buNone/>
+              <a:defRPr/>
+            </a:pPr>
+            <a:r>
+              <a:rPr lang="ko-KR" altLang="en-US"/>
+              <a:t>1UP 버섯: 추가 생명을 얻는다.</a:t>
+            </a:r>
+            <a:endParaRPr lang="ko-KR" altLang="en-US"/>
+          </a:p>
+        </p:txBody>
+      </p:sp>
+    </p:spTree>
+  </p:cSld>
+  <p:clrMapOvr>
+    <a:masterClrMapping/>
+  </p:clrMapOvr>
+  <mc:AlternateContent xmlns:mc="http://schemas.openxmlformats.org/markup-compatibility/2006">
+    <mc:Choice xmlns:p14="http://schemas.microsoft.com/office/powerpoint/2010/main" Requires="p14">
+      <p:transition xmlns:mc="http://schemas.openxmlformats.org/markup-compatibility/2006" xmlns:p14="http://schemas.microsoft.com/office/powerpoint/2010/main" mc:Ignorable="p14" p14:dur="500"/>
+    </mc:Choice>
+    <mc:Fallback>
+      <p:transition/>
+    </mc:Fallback>
+  </mc:AlternateContent>
+</p:sld>
+</file>
+
+<file path=ppt/slides/slide11.xml><?xml version="1.0" encoding="utf-8"?>
+<p:sld xmlns:r="http://schemas.openxmlformats.org/officeDocument/2006/relationships" xmlns:c="http://schemas.openxmlformats.org/drawingml/2006/chart" xmlns:a="http://schemas.openxmlformats.org/drawingml/2006/main" xmlns:dgm="http://schemas.openxmlformats.org/drawingml/2006/diagram" xmlns:dsp="http://schemas.microsoft.com/office/drawing/2008/diagram" xmlns:p="http://schemas.openxmlformats.org/presentationml/2006/main">
+  <p:cSld>
+    <p:spTree>
+      <p:nvGrpSpPr>
+        <p:cNvPr id="1" name=""/>
+        <p:cNvGrpSpPr/>
+        <p:nvPr/>
+      </p:nvGrpSpPr>
+      <p:grpSpPr>
+        <a:xfrm>
+          <a:off x="0" y="0"/>
+          <a:ext cx="0" cy="0"/>
+          <a:chOff x="0" y="0"/>
+          <a:chExt cx="0" cy="0"/>
+        </a:xfrm>
+      </p:grpSpPr>
+      <p:sp>
+        <p:nvSpPr>
+          <p:cNvPr id="2" name="제목 1"/>
+          <p:cNvSpPr>
+            <a:spLocks noGrp="1"/>
+          </p:cNvSpPr>
+          <p:nvPr>
+            <p:ph type="title" idx="0"/>
+          </p:nvPr>
+        </p:nvSpPr>
+        <p:spPr/>
+        <p:txBody>
+          <a:bodyPr/>
+          <a:lstStyle/>
+          <a:p>
+            <a:pPr algn="ctr">
+              <a:defRPr/>
+            </a:pPr>
+            <a:r>
+              <a:rPr lang="ko-KR" altLang="en-US"/>
+              <a:t>게임 기획서</a:t>
+            </a:r>
+            <a:endParaRPr lang="ko-KR" altLang="en-US"/>
+          </a:p>
+        </p:txBody>
+      </p:sp>
+      <p:sp>
+        <p:nvSpPr>
+          <p:cNvPr id="3" name="내용 개체 틀 2"/>
+          <p:cNvSpPr>
+            <a:spLocks noGrp="1"/>
+          </p:cNvSpPr>
+          <p:nvPr>
+            <p:ph idx="1"/>
+          </p:nvPr>
+        </p:nvSpPr>
+        <p:spPr/>
+        <p:txBody>
+          <a:bodyPr>
+            <a:normAutofit fontScale="92500"/>
+          </a:bodyPr>
+          <a:lstStyle/>
+          <a:p>
+            <a:pPr>
+              <a:defRPr/>
+            </a:pPr>
+            <a:r>
+              <a:rPr lang="ko-KR" altLang="en-US"/>
+              <a:t>5. 레벨 디자인</a:t>
+            </a:r>
+            <a:endParaRPr lang="ko-KR" altLang="en-US"/>
+          </a:p>
+          <a:p>
+            <a:pPr marL="0" indent="0">
+              <a:buNone/>
+              <a:defRPr/>
+            </a:pPr>
+            <a:r>
+              <a:rPr lang="ko-KR" altLang="en-US"/>
+              <a:t>장애물:</a:t>
+            </a:r>
+            <a:endParaRPr lang="ko-KR" altLang="en-US"/>
+          </a:p>
+          <a:p>
+            <a:pPr marL="0" indent="0">
+              <a:buNone/>
+              <a:defRPr/>
+            </a:pPr>
+            <a:r>
+              <a:rPr lang="ko-KR" altLang="en-US"/>
+              <a:t>구름 속의 플랫폼, 가시, 함정, 구덩이 등이 등장하여 플레이어의 길을 가로막는다.</a:t>
+            </a:r>
+            <a:endParaRPr lang="ko-KR" altLang="en-US"/>
+          </a:p>
+          <a:p>
+            <a:pPr marL="0" indent="0">
+              <a:buNone/>
+              <a:defRPr/>
+            </a:pPr>
+            <a:r>
+              <a:rPr lang="ko-KR" altLang="en-US"/>
+              <a:t>높은 점프가 요구되거나 좁은 길을 지나가야 하는 경우도 있다.</a:t>
+            </a:r>
+            <a:endParaRPr lang="ko-KR" altLang="en-US"/>
+          </a:p>
+          <a:p>
+            <a:pPr marL="0" indent="0">
+              <a:buNone/>
+              <a:defRPr/>
+            </a:pPr>
+            <a:r>
+              <a:rPr lang="ko-KR" altLang="en-US"/>
+              <a:t>적:</a:t>
+            </a:r>
+            <a:endParaRPr lang="ko-KR" altLang="en-US"/>
+          </a:p>
+          <a:p>
+            <a:pPr marL="0" indent="0">
+              <a:buNone/>
+              <a:defRPr/>
+            </a:pPr>
+            <a:r>
+              <a:rPr lang="ko-KR" altLang="en-US"/>
+              <a:t>굼바: 쉽게 밟아서 처치할 수 있는 기본적인 적.</a:t>
+            </a:r>
+            <a:endParaRPr lang="ko-KR" altLang="en-US"/>
+          </a:p>
+          <a:p>
+            <a:pPr marL="0" indent="0">
+              <a:buNone/>
+              <a:defRPr/>
+            </a:pPr>
+            <a:r>
+              <a:rPr lang="ko-KR" altLang="en-US"/>
+              <a:t>거북이</a:t>
+            </a:r>
+            <a:r>
+              <a:rPr lang="en-US" altLang="ko-KR"/>
+              <a:t>:</a:t>
+            </a:r>
+            <a:r>
+              <a:rPr lang="ko-KR" altLang="en-US"/>
+              <a:t> 밟으면 등껍질 상태가 되고 등껍질을 차서 공격할 수 있는 적</a:t>
+            </a:r>
+            <a:endParaRPr lang="ko-KR" altLang="en-US"/>
+          </a:p>
+          <a:p>
+            <a:pPr marL="0" indent="0">
+              <a:buNone/>
+              <a:defRPr/>
+            </a:pPr>
+            <a:r>
+              <a:rPr lang="ko-KR" altLang="en-US"/>
+              <a:t>파이프 속의 꽃: 파이프 안에서 갑자기 등장해 공격하는 식물형 적.</a:t>
+            </a:r>
+            <a:endParaRPr lang="ko-KR" altLang="en-US"/>
+          </a:p>
+        </p:txBody>
+      </p:sp>
+    </p:spTree>
+  </p:cSld>
+  <p:clrMapOvr>
+    <a:masterClrMapping/>
+  </p:clrMapOvr>
+  <mc:AlternateContent xmlns:mc="http://schemas.openxmlformats.org/markup-compatibility/2006">
+    <mc:Choice xmlns:p14="http://schemas.microsoft.com/office/powerpoint/2010/main" Requires="p14">
+      <p:transition xmlns:mc="http://schemas.openxmlformats.org/markup-compatibility/2006" xmlns:p14="http://schemas.microsoft.com/office/powerpoint/2010/main" mc:Ignorable="p14" p14:dur="500"/>
+    </mc:Choice>
+    <mc:Fallback>
+      <p:transition/>
+    </mc:Fallback>
+  </mc:AlternateContent>
+</p:sld>
+</file>
+
+<file path=ppt/slides/slide12.xml><?xml version="1.0" encoding="utf-8"?>
+<p:sld xmlns:r="http://schemas.openxmlformats.org/officeDocument/2006/relationships" xmlns:c="http://schemas.openxmlformats.org/drawingml/2006/chart" xmlns:a="http://schemas.openxmlformats.org/drawingml/2006/main" xmlns:dgm="http://schemas.openxmlformats.org/drawingml/2006/diagram" xmlns:dsp="http://schemas.microsoft.com/office/drawing/2008/diagram" xmlns:p="http://schemas.openxmlformats.org/presentationml/2006/main">
+  <p:cSld>
+    <p:spTree>
+      <p:nvGrpSpPr>
+        <p:cNvPr id="1" name=""/>
+        <p:cNvGrpSpPr/>
+        <p:nvPr/>
+      </p:nvGrpSpPr>
+      <p:grpSpPr>
+        <a:xfrm>
+          <a:off x="0" y="0"/>
+          <a:ext cx="0" cy="0"/>
+          <a:chOff x="0" y="0"/>
+          <a:chExt cx="0" cy="0"/>
+        </a:xfrm>
+      </p:grpSpPr>
+      <p:sp>
+        <p:nvSpPr>
+          <p:cNvPr id="2" name="제목 1"/>
+          <p:cNvSpPr>
+            <a:spLocks noGrp="1"/>
+          </p:cNvSpPr>
+          <p:nvPr>
+            <p:ph type="title" idx="0"/>
+          </p:nvPr>
+        </p:nvSpPr>
+        <p:spPr/>
+        <p:txBody>
+          <a:bodyPr/>
+          <a:lstStyle/>
+          <a:p>
+            <a:pPr algn="ctr">
+              <a:defRPr/>
+            </a:pPr>
+            <a:r>
+              <a:rPr lang="ko-KR" altLang="en-US"/>
+              <a:t>게임 기획서</a:t>
+            </a:r>
+            <a:endParaRPr lang="ko-KR" altLang="en-US"/>
+          </a:p>
+        </p:txBody>
+      </p:sp>
+      <p:sp>
+        <p:nvSpPr>
+          <p:cNvPr id="3" name="내용 개체 틀 2"/>
+          <p:cNvSpPr>
+            <a:spLocks noGrp="1"/>
+          </p:cNvSpPr>
+          <p:nvPr>
+            <p:ph idx="1"/>
+          </p:nvPr>
+        </p:nvSpPr>
+        <p:spPr/>
+        <p:txBody>
+          <a:bodyPr>
+            <a:normAutofit fontScale="92500" lnSpcReduction="10000"/>
+          </a:bodyPr>
+          <a:lstStyle/>
+          <a:p>
+            <a:pPr>
+              <a:defRPr/>
+            </a:pPr>
+            <a:r>
+              <a:rPr lang="ko-KR" altLang="en-US"/>
+              <a:t>6. 음악 및 사운드</a:t>
+            </a:r>
+            <a:endParaRPr lang="ko-KR" altLang="en-US"/>
+          </a:p>
+          <a:p>
+            <a:pPr>
+              <a:defRPr/>
+            </a:pPr>
+            <a:endParaRPr lang="ko-KR" altLang="en-US"/>
+          </a:p>
+          <a:p>
+            <a:pPr marL="0" indent="0">
+              <a:buNone/>
+              <a:defRPr/>
+            </a:pPr>
+            <a:r>
+              <a:rPr lang="ko-KR" altLang="en-US" b="1"/>
+              <a:t>배경음악</a:t>
+            </a:r>
+            <a:endParaRPr lang="ko-KR" altLang="en-US" b="1"/>
+          </a:p>
+          <a:p>
+            <a:pPr marL="0" indent="0">
+              <a:buNone/>
+              <a:defRPr/>
+            </a:pPr>
+            <a:endParaRPr lang="ko-KR" altLang="en-US" b="1"/>
+          </a:p>
+          <a:p>
+            <a:pPr marL="0" indent="0">
+              <a:buNone/>
+              <a:defRPr/>
+            </a:pPr>
+            <a:r>
+              <a:rPr lang="ko-KR" altLang="en-US"/>
+              <a:t> 각 스테이지의 분위기에 맞는 경쾌하고 중독성 있는 BGM이 삽입된다.</a:t>
+            </a:r>
+            <a:endParaRPr lang="ko-KR" altLang="en-US"/>
+          </a:p>
+          <a:p>
+            <a:pPr marL="0" indent="0">
+              <a:buNone/>
+              <a:defRPr/>
+            </a:pPr>
+            <a:endParaRPr lang="ko-KR" altLang="en-US"/>
+          </a:p>
+          <a:p>
+            <a:pPr marL="0" indent="0">
+              <a:buNone/>
+              <a:defRPr/>
+            </a:pPr>
+            <a:r>
+              <a:rPr lang="ko-KR" altLang="en-US" b="1"/>
+              <a:t>사운드 이펙트:</a:t>
+            </a:r>
+            <a:endParaRPr lang="ko-KR" altLang="en-US"/>
+          </a:p>
+          <a:p>
+            <a:pPr marL="0" indent="0">
+              <a:buNone/>
+              <a:defRPr/>
+            </a:pPr>
+            <a:r>
+              <a:rPr lang="ko-KR" altLang="en-US"/>
+              <a:t>점프 소리, 아이템 획득 소리, 적 처치 시의 효과음 등이 게임의 몰입감을 더해준다.</a:t>
+            </a:r>
+            <a:endParaRPr lang="ko-KR" altLang="en-US"/>
+          </a:p>
+        </p:txBody>
+      </p:sp>
+    </p:spTree>
+  </p:cSld>
+  <p:clrMapOvr>
+    <a:masterClrMapping/>
+  </p:clrMapOvr>
+  <mc:AlternateContent xmlns:mc="http://schemas.openxmlformats.org/markup-compatibility/2006">
+    <mc:Choice xmlns:p14="http://schemas.microsoft.com/office/powerpoint/2010/main" Requires="p14">
+      <p:transition xmlns:mc="http://schemas.openxmlformats.org/markup-compatibility/2006" xmlns:p14="http://schemas.microsoft.com/office/powerpoint/2010/main" mc:Ignorable="p14" p14:dur="500"/>
+    </mc:Choice>
+    <mc:Fallback>
+      <p:transition/>
+    </mc:Fallback>
+  </mc:AlternateContent>
+</p:sld>
+</file>
+
+<file path=ppt/slides/slide13.xml><?xml version="1.0" encoding="utf-8"?>
+<p:sld xmlns:r="http://schemas.openxmlformats.org/officeDocument/2006/relationships" xmlns:c="http://schemas.openxmlformats.org/drawingml/2006/chart" xmlns:a="http://schemas.openxmlformats.org/drawingml/2006/main" xmlns:dgm="http://schemas.openxmlformats.org/drawingml/2006/diagram" xmlns:dsp="http://schemas.microsoft.com/office/drawing/2008/diagram" xmlns:p="http://schemas.openxmlformats.org/presentationml/2006/main">
+  <p:cSld>
+    <p:spTree>
+      <p:nvGrpSpPr>
+        <p:cNvPr id="1" name=""/>
+        <p:cNvGrpSpPr/>
+        <p:nvPr/>
+      </p:nvGrpSpPr>
+      <p:grpSpPr>
+        <a:xfrm>
+          <a:off x="0" y="0"/>
+          <a:ext cx="0" cy="0"/>
+          <a:chOff x="0" y="0"/>
+          <a:chExt cx="0" cy="0"/>
+        </a:xfrm>
+      </p:grpSpPr>
+      <p:sp>
+        <p:nvSpPr>
+          <p:cNvPr id="2" name="제목 1"/>
+          <p:cNvSpPr>
+            <a:spLocks noGrp="1"/>
+          </p:cNvSpPr>
+          <p:nvPr>
+            <p:ph type="title" idx="0"/>
+          </p:nvPr>
+        </p:nvSpPr>
+        <p:spPr/>
+        <p:txBody>
+          <a:bodyPr/>
+          <a:lstStyle/>
+          <a:p>
+            <a:pPr algn="ctr">
+              <a:defRPr/>
+            </a:pPr>
+            <a:r>
+              <a:rPr lang="ko-KR" altLang="en-US"/>
+              <a:t>게임 기획서</a:t>
+            </a:r>
+            <a:endParaRPr lang="ko-KR" altLang="en-US"/>
+          </a:p>
+        </p:txBody>
+      </p:sp>
+      <p:sp>
+        <p:nvSpPr>
+          <p:cNvPr id="3" name="내용 개체 틀 2"/>
+          <p:cNvSpPr>
+            <a:spLocks noGrp="1"/>
+          </p:cNvSpPr>
+          <p:nvPr>
+            <p:ph idx="1"/>
+          </p:nvPr>
+        </p:nvSpPr>
+        <p:spPr/>
+        <p:txBody>
+          <a:bodyPr>
+            <a:normAutofit fontScale="92500" lnSpcReduction="10000"/>
+          </a:bodyPr>
+          <a:lstStyle/>
+          <a:p>
+            <a:pPr>
+              <a:defRPr/>
+            </a:pPr>
+            <a:r>
+              <a:rPr lang="ko-KR" altLang="en-US"/>
+              <a:t>6. 음악 및 사운드</a:t>
+            </a:r>
+            <a:endParaRPr lang="ko-KR" altLang="en-US"/>
+          </a:p>
+          <a:p>
+            <a:pPr>
+              <a:defRPr/>
+            </a:pPr>
+            <a:endParaRPr lang="ko-KR" altLang="en-US"/>
+          </a:p>
+          <a:p>
+            <a:pPr marL="0" indent="0">
+              <a:buNone/>
+              <a:defRPr/>
+            </a:pPr>
+            <a:r>
+              <a:rPr lang="ko-KR" altLang="en-US" b="1"/>
+              <a:t>배경음악</a:t>
+            </a:r>
+            <a:endParaRPr lang="ko-KR" altLang="en-US" b="1"/>
+          </a:p>
+          <a:p>
+            <a:pPr marL="0" indent="0">
+              <a:buNone/>
+              <a:defRPr/>
+            </a:pPr>
+            <a:endParaRPr lang="ko-KR" altLang="en-US" b="1"/>
+          </a:p>
+          <a:p>
+            <a:pPr marL="0" indent="0">
+              <a:buNone/>
+              <a:defRPr/>
+            </a:pPr>
+            <a:r>
+              <a:rPr lang="ko-KR" altLang="en-US"/>
+              <a:t> 각 스테이지의 분위기에 맞는 경쾌하고 중독성 있는 BGM이 삽입된다.</a:t>
+            </a:r>
+            <a:endParaRPr lang="ko-KR" altLang="en-US"/>
+          </a:p>
+          <a:p>
+            <a:pPr marL="0" indent="0">
+              <a:buNone/>
+              <a:defRPr/>
+            </a:pPr>
+            <a:endParaRPr lang="ko-KR" altLang="en-US"/>
+          </a:p>
+          <a:p>
+            <a:pPr marL="0" indent="0">
+              <a:buNone/>
+              <a:defRPr/>
+            </a:pPr>
+            <a:r>
+              <a:rPr lang="ko-KR" altLang="en-US" b="1"/>
+              <a:t>사운드 이펙트:</a:t>
+            </a:r>
+            <a:endParaRPr lang="ko-KR" altLang="en-US"/>
+          </a:p>
+          <a:p>
+            <a:pPr marL="0" indent="0">
+              <a:buNone/>
+              <a:defRPr/>
+            </a:pPr>
+            <a:r>
+              <a:rPr lang="ko-KR" altLang="en-US"/>
+              <a:t>점프 소리, 아이템 획득 소리, 적 처치 시의 효과음 등이 게임의 몰입감을 더해준다.</a:t>
+            </a:r>
+            <a:endParaRPr lang="ko-KR" altLang="en-US"/>
+          </a:p>
+        </p:txBody>
+      </p:sp>
+    </p:spTree>
+  </p:cSld>
+  <p:clrMapOvr>
+    <a:masterClrMapping/>
+  </p:clrMapOvr>
+  <mc:AlternateContent xmlns:mc="http://schemas.openxmlformats.org/markup-compatibility/2006">
+    <mc:Choice xmlns:p14="http://schemas.microsoft.com/office/powerpoint/2010/main" Requires="p14">
+      <p:transition xmlns:mc="http://schemas.openxmlformats.org/markup-compatibility/2006" xmlns:p14="http://schemas.microsoft.com/office/powerpoint/2010/main" mc:Ignorable="p14" p14:dur="500"/>
+    </mc:Choice>
+    <mc:Fallback>
+      <p:transition/>
+    </mc:Fallback>
+  </mc:AlternateContent>
+</p:sld>
+</file>
+
+<file path=ppt/slides/slide14.xml><?xml version="1.0" encoding="utf-8"?>
+<p:sld xmlns:r="http://schemas.openxmlformats.org/officeDocument/2006/relationships" xmlns:c="http://schemas.openxmlformats.org/drawingml/2006/chart" xmlns:a="http://schemas.openxmlformats.org/drawingml/2006/main" xmlns:dgm="http://schemas.openxmlformats.org/drawingml/2006/diagram" xmlns:dsp="http://schemas.microsoft.com/office/drawing/2008/diagram" xmlns:p="http://schemas.openxmlformats.org/presentationml/2006/main">
+  <p:cSld>
+    <p:spTree>
+      <p:nvGrpSpPr>
+        <p:cNvPr id="1" name=""/>
+        <p:cNvGrpSpPr/>
+        <p:nvPr/>
+      </p:nvGrpSpPr>
+      <p:grpSpPr>
+        <a:xfrm>
+          <a:off x="0" y="0"/>
+          <a:ext cx="0" cy="0"/>
+          <a:chOff x="0" y="0"/>
+          <a:chExt cx="0" cy="0"/>
+        </a:xfrm>
+      </p:grpSpPr>
+      <p:sp>
+        <p:nvSpPr>
+          <p:cNvPr id="2" name="제목 1"/>
+          <p:cNvSpPr>
+            <a:spLocks noGrp="1"/>
+          </p:cNvSpPr>
+          <p:nvPr>
+            <p:ph type="title" idx="0"/>
+          </p:nvPr>
+        </p:nvSpPr>
+        <p:spPr/>
+        <p:txBody>
+          <a:bodyPr/>
+          <a:lstStyle/>
+          <a:p>
+            <a:pPr algn="ctr">
+              <a:defRPr/>
+            </a:pPr>
+            <a:r>
+              <a:rPr lang="ko-KR" altLang="en-US"/>
+              <a:t>게임 기획서</a:t>
+            </a:r>
+            <a:endParaRPr lang="ko-KR" altLang="en-US"/>
+          </a:p>
+        </p:txBody>
+      </p:sp>
+      <p:sp>
+        <p:nvSpPr>
+          <p:cNvPr id="3" name="내용 개체 틀 2"/>
+          <p:cNvSpPr>
+            <a:spLocks noGrp="1"/>
+          </p:cNvSpPr>
+          <p:nvPr>
+            <p:ph idx="1"/>
+          </p:nvPr>
+        </p:nvSpPr>
+        <p:spPr/>
+        <p:txBody>
+          <a:bodyPr/>
+          <a:lstStyle/>
+          <a:p>
+            <a:pPr>
+              <a:defRPr/>
+            </a:pPr>
+            <a:r>
+              <a:rPr lang="ko-KR" altLang="en-US"/>
+              <a:t>7. 목표 및 승리 조건</a:t>
+            </a:r>
+            <a:endParaRPr lang="ko-KR" altLang="en-US"/>
+          </a:p>
+          <a:p>
+            <a:pPr>
+              <a:defRPr/>
+            </a:pPr>
+            <a:endParaRPr lang="ko-KR" altLang="en-US"/>
+          </a:p>
+          <a:p>
+            <a:pPr marL="0" indent="0">
+              <a:buNone/>
+              <a:defRPr/>
+            </a:pPr>
+            <a:r>
+              <a:rPr lang="ko-KR" altLang="en-US"/>
+              <a:t>모든 스테이지를 클리어하고 마지막 스테이지에서 쿠파를 처치한 후 피치 공주를 구출하면 게임 클리어.</a:t>
+            </a:r>
+            <a:endParaRPr lang="ko-KR" altLang="en-US"/>
+          </a:p>
+        </p:txBody>
+      </p:sp>
+    </p:spTree>
+  </p:cSld>
+  <p:clrMapOvr>
+    <a:masterClrMapping/>
+  </p:clrMapOvr>
+  <mc:AlternateContent xmlns:mc="http://schemas.openxmlformats.org/markup-compatibility/2006">
+    <mc:Choice xmlns:p14="http://schemas.microsoft.com/office/powerpoint/2010/main" Requires="p14">
+      <p:transition xmlns:mc="http://schemas.openxmlformats.org/markup-compatibility/2006" xmlns:p14="http://schemas.microsoft.com/office/powerpoint/2010/main" mc:Ignorable="p14" p14:dur="500"/>
+    </mc:Choice>
+    <mc:Fallback>
+      <p:transition/>
+    </mc:Fallback>
+  </mc:AlternateContent>
+</p:sld>
+</file>
+
+<file path=ppt/slides/slide15.xml><?xml version="1.0" encoding="utf-8"?>
+<p:sld xmlns:r="http://schemas.openxmlformats.org/officeDocument/2006/relationships" xmlns:c="http://schemas.openxmlformats.org/drawingml/2006/chart" xmlns:a="http://schemas.openxmlformats.org/drawingml/2006/main" xmlns:dgm="http://schemas.openxmlformats.org/drawingml/2006/diagram" xmlns:dsp="http://schemas.microsoft.com/office/drawing/2008/diagram" xmlns:p="http://schemas.openxmlformats.org/presentationml/2006/main">
+  <p:cSld>
+    <p:spTree>
+      <p:nvGrpSpPr>
+        <p:cNvPr id="1" name=""/>
+        <p:cNvGrpSpPr/>
+        <p:nvPr/>
+      </p:nvGrpSpPr>
+      <p:grpSpPr>
+        <a:xfrm>
+          <a:off x="0" y="0"/>
+          <a:ext cx="0" cy="0"/>
+          <a:chOff x="0" y="0"/>
+          <a:chExt cx="0" cy="0"/>
+        </a:xfrm>
+      </p:grpSpPr>
+      <p:sp>
+        <p:nvSpPr>
+          <p:cNvPr id="2" name="제목 1"/>
+          <p:cNvSpPr>
+            <a:spLocks noGrp="1"/>
+          </p:cNvSpPr>
+          <p:nvPr>
+            <p:ph type="title" idx="0"/>
+          </p:nvPr>
+        </p:nvSpPr>
+        <p:spPr/>
+        <p:txBody>
+          <a:bodyPr/>
+          <a:lstStyle/>
+          <a:p>
+            <a:pPr algn="ctr">
+              <a:defRPr/>
+            </a:pPr>
+            <a:r>
+              <a:rPr lang="ko-KR" altLang="en-US"/>
+              <a:t>게임 기획서</a:t>
+            </a:r>
+            <a:endParaRPr lang="ko-KR" altLang="en-US"/>
+          </a:p>
+        </p:txBody>
+      </p:sp>
+      <p:sp>
+        <p:nvSpPr>
+          <p:cNvPr id="3" name="내용 개체 틀 2"/>
+          <p:cNvSpPr>
+            <a:spLocks noGrp="1"/>
+          </p:cNvSpPr>
+          <p:nvPr>
+            <p:ph idx="1"/>
+          </p:nvPr>
+        </p:nvSpPr>
+        <p:spPr/>
+        <p:txBody>
+          <a:bodyPr/>
+          <a:lstStyle/>
+          <a:p>
+            <a:pPr>
+              <a:defRPr/>
+            </a:pPr>
+            <a:r>
+              <a:rPr lang="en-US" altLang="ko-KR"/>
+              <a:t>8</a:t>
+            </a:r>
+            <a:r>
+              <a:rPr lang="ko-KR" altLang="en-US"/>
+              <a:t>. 기대 효과</a:t>
+            </a:r>
+            <a:endParaRPr lang="ko-KR" altLang="en-US"/>
+          </a:p>
+          <a:p>
+            <a:pPr>
+              <a:defRPr/>
+            </a:pPr>
+            <a:endParaRPr lang="ko-KR" altLang="en-US"/>
+          </a:p>
+          <a:p>
+            <a:pPr marL="0" indent="0">
+              <a:buNone/>
+              <a:defRPr/>
+            </a:pPr>
+            <a:r>
+              <a:rPr lang="ko-KR" altLang="en-US"/>
+              <a:t>쉬운 조작법과 직관적인 레벨 디자인으로 남녀노소 누구나 즐길 수 있는 게임.</a:t>
+            </a:r>
+            <a:endParaRPr lang="ko-KR" altLang="en-US"/>
+          </a:p>
+          <a:p>
+            <a:pPr marL="0" indent="0">
+              <a:buNone/>
+              <a:defRPr/>
+            </a:pPr>
+            <a:r>
+              <a:rPr lang="ko-KR" altLang="en-US"/>
+              <a:t>다양한 아이템과 전략적 요소로 인해 반복적인 플레이에도 지루함이 없다</a:t>
+            </a:r>
+            <a:r>
+              <a:rPr lang="en-US" altLang="ko-KR"/>
+              <a:t>.</a:t>
+            </a:r>
+            <a:endParaRPr lang="en-US" altLang="ko-KR"/>
+          </a:p>
+        </p:txBody>
+      </p:sp>
+    </p:spTree>
+  </p:cSld>
+  <p:clrMapOvr>
+    <a:masterClrMapping/>
+  </p:clrMapOvr>
+  <mc:AlternateContent xmlns:mc="http://schemas.openxmlformats.org/markup-compatibility/2006">
+    <mc:Choice xmlns:p14="http://schemas.microsoft.com/office/powerpoint/2010/main" Requires="p14">
+      <p:transition xmlns:mc="http://schemas.openxmlformats.org/markup-compatibility/2006" xmlns:p14="http://schemas.microsoft.com/office/powerpoint/2010/main" mc:Ignorable="p14" p14:dur="500"/>
+    </mc:Choice>
+    <mc:Fallback>
+      <p:transition/>
+    </mc:Fallback>
+  </mc:AlternateContent>
+</p:sld>
+</file>
+
 <file path=ppt/slides/slide2.xml><?xml version="1.0" encoding="utf-8"?>
 <p:sld xmlns:a="http://schemas.openxmlformats.org/drawingml/2006/main" xmlns:r="http://schemas.openxmlformats.org/officeDocument/2006/relationships" xmlns:p="http://schemas.openxmlformats.org/presentationml/2006/main">
   <p:cSld>
@@ -3922,45 +4783,470 @@
 </p:sld>
 </file>
 
+<file path=ppt/slides/slide7.xml><?xml version="1.0" encoding="utf-8"?>
+<p:sld xmlns:r="http://schemas.openxmlformats.org/officeDocument/2006/relationships" xmlns:c="http://schemas.openxmlformats.org/drawingml/2006/chart" xmlns:a="http://schemas.openxmlformats.org/drawingml/2006/main" xmlns:dgm="http://schemas.openxmlformats.org/drawingml/2006/diagram" xmlns:dsp="http://schemas.microsoft.com/office/drawing/2008/diagram" xmlns:p="http://schemas.openxmlformats.org/presentationml/2006/main">
+  <p:cSld>
+    <p:spTree>
+      <p:nvGrpSpPr>
+        <p:cNvPr id="1" name=""/>
+        <p:cNvGrpSpPr/>
+        <p:nvPr/>
+      </p:nvGrpSpPr>
+      <p:grpSpPr>
+        <a:xfrm>
+          <a:off x="0" y="0"/>
+          <a:ext cx="0" cy="0"/>
+          <a:chOff x="0" y="0"/>
+          <a:chExt cx="0" cy="0"/>
+        </a:xfrm>
+      </p:grpSpPr>
+      <p:sp>
+        <p:nvSpPr>
+          <p:cNvPr id="2" name="제목 1"/>
+          <p:cNvSpPr>
+            <a:spLocks noGrp="1"/>
+          </p:cNvSpPr>
+          <p:nvPr>
+            <p:ph type="title" idx="0"/>
+          </p:nvPr>
+        </p:nvSpPr>
+        <p:spPr/>
+        <p:txBody>
+          <a:bodyPr/>
+          <a:lstStyle/>
+          <a:p>
+            <a:pPr algn="ctr">
+              <a:defRPr/>
+            </a:pPr>
+            <a:r>
+              <a:rPr lang="ko-KR" altLang="en-US"/>
+              <a:t>게임 기획서</a:t>
+            </a:r>
+            <a:endParaRPr lang="ko-KR" altLang="en-US"/>
+          </a:p>
+        </p:txBody>
+      </p:sp>
+      <p:sp>
+        <p:nvSpPr>
+          <p:cNvPr id="3" name="내용 개체 틀 2"/>
+          <p:cNvSpPr>
+            <a:spLocks noGrp="1"/>
+          </p:cNvSpPr>
+          <p:nvPr>
+            <p:ph idx="1"/>
+          </p:nvPr>
+        </p:nvSpPr>
+        <p:spPr/>
+        <p:txBody>
+          <a:bodyPr/>
+          <a:lstStyle/>
+          <a:p>
+            <a:pPr>
+              <a:defRPr/>
+            </a:pPr>
+            <a:r>
+              <a:rPr lang="ko-KR" altLang="en-US"/>
+              <a:t>1. 개요</a:t>
+            </a:r>
+            <a:endParaRPr lang="ko-KR" altLang="en-US"/>
+          </a:p>
+          <a:p>
+            <a:pPr marL="0" indent="0">
+              <a:buNone/>
+              <a:defRPr/>
+            </a:pPr>
+            <a:r>
+              <a:rPr lang="ko-KR" altLang="en-US"/>
+              <a:t>게임 이름: 슈퍼 마리오 브라더스</a:t>
+            </a:r>
+            <a:endParaRPr lang="ko-KR" altLang="en-US"/>
+          </a:p>
+          <a:p>
+            <a:pPr marL="0" indent="0">
+              <a:buNone/>
+              <a:defRPr/>
+            </a:pPr>
+            <a:r>
+              <a:rPr lang="ko-KR" altLang="en-US"/>
+              <a:t>장르: 액션 플랫폼 게임</a:t>
+            </a:r>
+            <a:endParaRPr lang="ko-KR" altLang="en-US"/>
+          </a:p>
+          <a:p>
+            <a:pPr marL="0" indent="0">
+              <a:buNone/>
+              <a:defRPr/>
+            </a:pPr>
+            <a:r>
+              <a:rPr lang="ko-KR" altLang="en-US"/>
+              <a:t>플레이 방식: 싱글 플레이</a:t>
+            </a:r>
+            <a:endParaRPr lang="ko-KR" altLang="en-US"/>
+          </a:p>
+          <a:p>
+            <a:pPr marL="0" indent="0">
+              <a:buNone/>
+              <a:defRPr/>
+            </a:pPr>
+            <a:r>
+              <a:rPr lang="ko-KR" altLang="en-US"/>
+              <a:t>목표: 플레이어는 주인공 마리오를 조종해 피치 공주를 구하고 쿠파와 그 부하들로부터 버섯 왕국을 지켜야 한다.</a:t>
+            </a:r>
+            <a:endParaRPr lang="ko-KR" altLang="en-US"/>
+          </a:p>
+          <a:p>
+            <a:pPr>
+              <a:defRPr/>
+            </a:pPr>
+            <a:endParaRPr lang="ko-KR" altLang="en-US"/>
+          </a:p>
+          <a:p>
+            <a:pPr>
+              <a:defRPr/>
+            </a:pPr>
+            <a:endParaRPr lang="ko-KR" altLang="en-US"/>
+          </a:p>
+        </p:txBody>
+      </p:sp>
+    </p:spTree>
+  </p:cSld>
+  <p:clrMapOvr>
+    <a:masterClrMapping/>
+  </p:clrMapOvr>
+  <mc:AlternateContent xmlns:mc="http://schemas.openxmlformats.org/markup-compatibility/2006">
+    <mc:Choice xmlns:p14="http://schemas.microsoft.com/office/powerpoint/2010/main" Requires="p14">
+      <p:transition xmlns:mc="http://schemas.openxmlformats.org/markup-compatibility/2006" xmlns:p14="http://schemas.microsoft.com/office/powerpoint/2010/main" mc:Ignorable="p14" p14:dur="500"/>
+    </mc:Choice>
+    <mc:Fallback>
+      <p:transition/>
+    </mc:Fallback>
+  </mc:AlternateContent>
+</p:sld>
+</file>
+
+<file path=ppt/slides/slide8.xml><?xml version="1.0" encoding="utf-8"?>
+<p:sld xmlns:r="http://schemas.openxmlformats.org/officeDocument/2006/relationships" xmlns:c="http://schemas.openxmlformats.org/drawingml/2006/chart" xmlns:a="http://schemas.openxmlformats.org/drawingml/2006/main" xmlns:dgm="http://schemas.openxmlformats.org/drawingml/2006/diagram" xmlns:dsp="http://schemas.microsoft.com/office/drawing/2008/diagram" xmlns:p="http://schemas.openxmlformats.org/presentationml/2006/main">
+  <p:cSld>
+    <p:spTree>
+      <p:nvGrpSpPr>
+        <p:cNvPr id="1" name=""/>
+        <p:cNvGrpSpPr/>
+        <p:nvPr/>
+      </p:nvGrpSpPr>
+      <p:grpSpPr>
+        <a:xfrm>
+          <a:off x="0" y="0"/>
+          <a:ext cx="0" cy="0"/>
+          <a:chOff x="0" y="0"/>
+          <a:chExt cx="0" cy="0"/>
+        </a:xfrm>
+      </p:grpSpPr>
+      <p:sp>
+        <p:nvSpPr>
+          <p:cNvPr id="2" name="제목 1"/>
+          <p:cNvSpPr>
+            <a:spLocks noGrp="1"/>
+          </p:cNvSpPr>
+          <p:nvPr>
+            <p:ph type="title" idx="0"/>
+          </p:nvPr>
+        </p:nvSpPr>
+        <p:spPr/>
+        <p:txBody>
+          <a:bodyPr/>
+          <a:lstStyle/>
+          <a:p>
+            <a:pPr algn="ctr">
+              <a:defRPr/>
+            </a:pPr>
+            <a:r>
+              <a:rPr lang="ko-KR" altLang="en-US"/>
+              <a:t>게임 기획서</a:t>
+            </a:r>
+            <a:endParaRPr lang="ko-KR" altLang="en-US"/>
+          </a:p>
+        </p:txBody>
+      </p:sp>
+      <p:sp>
+        <p:nvSpPr>
+          <p:cNvPr id="3" name="내용 개체 틀 2"/>
+          <p:cNvSpPr>
+            <a:spLocks noGrp="1"/>
+          </p:cNvSpPr>
+          <p:nvPr>
+            <p:ph idx="1"/>
+          </p:nvPr>
+        </p:nvSpPr>
+        <p:spPr/>
+        <p:txBody>
+          <a:bodyPr>
+            <a:normAutofit lnSpcReduction="10000"/>
+          </a:bodyPr>
+          <a:lstStyle/>
+          <a:p>
+            <a:pPr>
+              <a:defRPr/>
+            </a:pPr>
+            <a:r>
+              <a:rPr lang="ko-KR" altLang="en-US"/>
+              <a:t>4. 게임 플레이</a:t>
+            </a:r>
+            <a:endParaRPr lang="ko-KR" altLang="en-US"/>
+          </a:p>
+          <a:p>
+            <a:pPr>
+              <a:defRPr/>
+            </a:pPr>
+            <a:endParaRPr lang="ko-KR" altLang="en-US"/>
+          </a:p>
+          <a:p>
+            <a:pPr marL="0" indent="0">
+              <a:buNone/>
+              <a:defRPr/>
+            </a:pPr>
+            <a:r>
+              <a:rPr lang="ko-KR" altLang="en-US" b="1"/>
+              <a:t>조작 방식</a:t>
+            </a:r>
+            <a:endParaRPr lang="ko-KR" altLang="en-US" b="1"/>
+          </a:p>
+          <a:p>
+            <a:pPr marL="0" indent="0">
+              <a:buNone/>
+              <a:defRPr/>
+            </a:pPr>
+            <a:endParaRPr lang="ko-KR" altLang="en-US" b="1"/>
+          </a:p>
+          <a:p>
+            <a:pPr marL="0" indent="0">
+              <a:buNone/>
+              <a:defRPr/>
+            </a:pPr>
+            <a:r>
+              <a:rPr lang="ko-KR" altLang="en-US"/>
+              <a:t>이동: 좌우 방향키로 캐릭터를 움직인다.</a:t>
+            </a:r>
+            <a:endParaRPr lang="ko-KR" altLang="en-US"/>
+          </a:p>
+          <a:p>
+            <a:pPr marL="0" indent="0">
+              <a:buNone/>
+              <a:defRPr/>
+            </a:pPr>
+            <a:r>
+              <a:rPr lang="ko-KR" altLang="en-US"/>
+              <a:t>점프: 점프 버튼을 눌러 장애물을 넘거나 적을 밟는다.</a:t>
+            </a:r>
+            <a:endParaRPr lang="ko-KR" altLang="en-US"/>
+          </a:p>
+          <a:p>
+            <a:pPr marL="0" indent="0">
+              <a:buNone/>
+              <a:defRPr/>
+            </a:pPr>
+            <a:r>
+              <a:rPr lang="ko-KR" altLang="en-US"/>
+              <a:t>파이어볼: 파이어 플라워를 획득하면 파이어볼을 던져 적을 공격할 수 있다.</a:t>
+            </a:r>
+            <a:endParaRPr lang="ko-KR" altLang="en-US"/>
+          </a:p>
+          <a:p>
+            <a:pPr marL="0" indent="0">
+              <a:buNone/>
+              <a:defRPr/>
+            </a:pPr>
+            <a:endParaRPr lang="ko-KR" altLang="en-US"/>
+          </a:p>
+        </p:txBody>
+      </p:sp>
+    </p:spTree>
+  </p:cSld>
+  <p:clrMapOvr>
+    <a:masterClrMapping/>
+  </p:clrMapOvr>
+  <mc:AlternateContent xmlns:mc="http://schemas.openxmlformats.org/markup-compatibility/2006">
+    <mc:Choice xmlns:p14="http://schemas.microsoft.com/office/powerpoint/2010/main" Requires="p14">
+      <p:transition xmlns:mc="http://schemas.openxmlformats.org/markup-compatibility/2006" xmlns:p14="http://schemas.microsoft.com/office/powerpoint/2010/main" mc:Ignorable="p14" p14:dur="500"/>
+    </mc:Choice>
+    <mc:Fallback>
+      <p:transition/>
+    </mc:Fallback>
+  </mc:AlternateContent>
+</p:sld>
+</file>
+
+<file path=ppt/slides/slide9.xml><?xml version="1.0" encoding="utf-8"?>
+<p:sld xmlns:r="http://schemas.openxmlformats.org/officeDocument/2006/relationships" xmlns:c="http://schemas.openxmlformats.org/drawingml/2006/chart" xmlns:a="http://schemas.openxmlformats.org/drawingml/2006/main" xmlns:dgm="http://schemas.openxmlformats.org/drawingml/2006/diagram" xmlns:dsp="http://schemas.microsoft.com/office/drawing/2008/diagram" xmlns:p="http://schemas.openxmlformats.org/presentationml/2006/main">
+  <p:cSld>
+    <p:spTree>
+      <p:nvGrpSpPr>
+        <p:cNvPr id="1" name=""/>
+        <p:cNvGrpSpPr/>
+        <p:nvPr/>
+      </p:nvGrpSpPr>
+      <p:grpSpPr>
+        <a:xfrm>
+          <a:off x="0" y="0"/>
+          <a:ext cx="0" cy="0"/>
+          <a:chOff x="0" y="0"/>
+          <a:chExt cx="0" cy="0"/>
+        </a:xfrm>
+      </p:grpSpPr>
+      <p:sp>
+        <p:nvSpPr>
+          <p:cNvPr id="2" name="제목 1"/>
+          <p:cNvSpPr>
+            <a:spLocks noGrp="1"/>
+          </p:cNvSpPr>
+          <p:nvPr>
+            <p:ph type="title" idx="0"/>
+          </p:nvPr>
+        </p:nvSpPr>
+        <p:spPr/>
+        <p:txBody>
+          <a:bodyPr/>
+          <a:lstStyle/>
+          <a:p>
+            <a:pPr algn="ctr">
+              <a:defRPr/>
+            </a:pPr>
+            <a:r>
+              <a:rPr lang="ko-KR" altLang="en-US"/>
+              <a:t>게임 기획서</a:t>
+            </a:r>
+            <a:endParaRPr lang="ko-KR" altLang="en-US"/>
+          </a:p>
+        </p:txBody>
+      </p:sp>
+      <p:sp>
+        <p:nvSpPr>
+          <p:cNvPr id="3" name="내용 개체 틀 2"/>
+          <p:cNvSpPr>
+            <a:spLocks noGrp="1"/>
+          </p:cNvSpPr>
+          <p:nvPr>
+            <p:ph idx="1"/>
+          </p:nvPr>
+        </p:nvSpPr>
+        <p:spPr/>
+        <p:txBody>
+          <a:bodyPr>
+            <a:normAutofit lnSpcReduction="10000"/>
+          </a:bodyPr>
+          <a:lstStyle/>
+          <a:p>
+            <a:pPr>
+              <a:defRPr/>
+            </a:pPr>
+            <a:r>
+              <a:rPr lang="ko-KR" altLang="en-US"/>
+              <a:t>4. 게임 플레이</a:t>
+            </a:r>
+            <a:endParaRPr lang="ko-KR" altLang="en-US"/>
+          </a:p>
+          <a:p>
+            <a:pPr>
+              <a:defRPr/>
+            </a:pPr>
+            <a:endParaRPr lang="ko-KR" altLang="en-US"/>
+          </a:p>
+          <a:p>
+            <a:pPr marL="0" indent="0">
+              <a:buNone/>
+              <a:defRPr/>
+            </a:pPr>
+            <a:r>
+              <a:rPr lang="ko-KR" altLang="en-US" b="1"/>
+              <a:t>스테이지 구성</a:t>
+            </a:r>
+            <a:endParaRPr lang="ko-KR" altLang="en-US"/>
+          </a:p>
+          <a:p>
+            <a:pPr marL="0" indent="0">
+              <a:buNone/>
+              <a:defRPr/>
+            </a:pPr>
+            <a:endParaRPr lang="ko-KR" altLang="en-US"/>
+          </a:p>
+          <a:p>
+            <a:pPr marL="0" indent="0">
+              <a:buNone/>
+              <a:defRPr/>
+            </a:pPr>
+            <a:r>
+              <a:rPr lang="ko-KR" altLang="en-US"/>
+              <a:t>게임은 여러 개의 월드로 나누어져 있으며, 각 월드는 여러 스테이지로 구성된다.</a:t>
+            </a:r>
+            <a:endParaRPr lang="ko-KR" altLang="en-US"/>
+          </a:p>
+          <a:p>
+            <a:pPr marL="0" indent="0">
+              <a:buNone/>
+              <a:defRPr/>
+            </a:pPr>
+            <a:r>
+              <a:rPr lang="ko-KR" altLang="en-US"/>
+              <a:t>마지막 스테이지는 쿠파와의 보스전으로, 피치 공주를 구출하는 것이 목표이다.</a:t>
+            </a:r>
+            <a:endParaRPr lang="ko-KR" altLang="en-US"/>
+          </a:p>
+        </p:txBody>
+      </p:sp>
+    </p:spTree>
+  </p:cSld>
+  <p:clrMapOvr>
+    <a:masterClrMapping/>
+  </p:clrMapOvr>
+  <mc:AlternateContent xmlns:mc="http://schemas.openxmlformats.org/markup-compatibility/2006">
+    <mc:Choice xmlns:p14="http://schemas.microsoft.com/office/powerpoint/2010/main" Requires="p14">
+      <p:transition xmlns:mc="http://schemas.openxmlformats.org/markup-compatibility/2006" xmlns:p14="http://schemas.microsoft.com/office/powerpoint/2010/main" mc:Ignorable="p14" p14:dur="500"/>
+    </mc:Choice>
+    <mc:Fallback>
+      <p:transition/>
+    </mc:Fallback>
+  </mc:AlternateContent>
+</p:sld>
+</file>
+
 <file path=ppt/theme/theme1.xml><?xml version="1.0" encoding="utf-8"?>
-<a:theme xmlns:a="http://schemas.openxmlformats.org/drawingml/2006/main" name="Office 테마">
+<a:theme xmlns:r="http://schemas.openxmlformats.org/officeDocument/2006/relationships" xmlns:c="http://schemas.openxmlformats.org/drawingml/2006/chart" xmlns:dgm="http://schemas.openxmlformats.org/drawingml/2006/diagram" xmlns:dsp="http://schemas.microsoft.com/office/drawing/2008/diagram" xmlns:a="http://schemas.openxmlformats.org/drawingml/2006/main" xmlns:pic="http://schemas.openxmlformats.org/drawingml/2006/picture" xmlns:wp="http://schemas.openxmlformats.org/drawingml/2006/wordprocessingDrawing" xmlns:xdr="http://schemas.openxmlformats.org/drawingml/2006/spreadsheetDrawing" xmlns:lc="http://schemas.openxmlformats.org/drawingml/2006/lockedCanvas" xmlns:p="http://schemas.openxmlformats.org/presentationml/2006/main" name="Office 테마">
   <a:themeElements>
     <a:clrScheme name="Office">
       <a:dk1>
         <a:sysClr val="windowText" lastClr="000000"/>
       </a:dk1>
       <a:lt1>
-        <a:sysClr val="window" lastClr="FFFFFF"/>
+        <a:sysClr val="window" lastClr="ffffff"/>
       </a:lt1>
       <a:dk2>
-        <a:srgbClr val="44546A"/>
+        <a:srgbClr val="44546a"/>
       </a:dk2>
       <a:lt2>
-        <a:srgbClr val="E7E6E6"/>
+        <a:srgbClr val="e7e6e6"/>
       </a:lt2>
       <a:accent1>
-        <a:srgbClr val="5B9BD5"/>
+        <a:srgbClr val="5b9bd5"/>
       </a:accent1>
       <a:accent2>
-        <a:srgbClr val="ED7D31"/>
+        <a:srgbClr val="ed7d31"/>
       </a:accent2>
       <a:accent3>
-        <a:srgbClr val="A5A5A5"/>
+        <a:srgbClr val="a5a5a5"/>
       </a:accent3>
       <a:accent4>
-        <a:srgbClr val="FFC000"/>
+        <a:srgbClr val="ffc000"/>
       </a:accent4>
       <a:accent5>
-        <a:srgbClr val="4472C4"/>
+        <a:srgbClr val="4472c4"/>
       </a:accent5>
       <a:accent6>
-        <a:srgbClr val="70AD47"/>
+        <a:srgbClr val="70ad47"/>
       </a:accent6>
       <a:hlink>
-        <a:srgbClr val="0563C1"/>
+        <a:srgbClr val="0563c1"/>
       </a:hlink>
       <a:folHlink>
-        <a:srgbClr val="954F72"/>
+        <a:srgbClr val="954f72"/>
       </a:folHlink>
     </a:clrScheme>
     <a:fontScheme name="Office">
@@ -3968,7 +5254,7 @@
         <a:latin typeface="맑은 고딕" panose="020F0302020204030204"/>
         <a:ea typeface=""/>
         <a:cs typeface=""/>
-        <a:font script="Jpan" typeface="游ゴシック Light"/>
+        <a:font script="Jpan" typeface="Yu Gothic Light"/>
         <a:font script="Hang" typeface="맑은 고딕"/>
         <a:font script="Hans" typeface="等线 Light"/>
         <a:font script="Hant" typeface="新細明體"/>
@@ -4003,7 +5289,7 @@
         <a:latin typeface="맑은 고딕" panose="020F0502020204030204"/>
         <a:ea typeface=""/>
         <a:cs typeface=""/>
-        <a:font script="Jpan" typeface="游ゴシック"/>
+        <a:font script="Jpan" typeface="Yu Gothic"/>
         <a:font script="Hang" typeface="맑은 고딕"/>
         <a:font script="Hans" typeface="等线"/>
         <a:font script="Hant" typeface="新細明體"/>
@@ -4099,21 +5385,21 @@
             <a:schemeClr val="phClr"/>
           </a:solidFill>
           <a:prstDash val="solid"/>
-          <a:miter lim="800000"/>
+          <a:miter/>
         </a:ln>
         <a:ln w="12700" cap="flat" cmpd="sng" algn="ctr">
           <a:solidFill>
             <a:schemeClr val="phClr"/>
           </a:solidFill>
           <a:prstDash val="solid"/>
-          <a:miter lim="800000"/>
+          <a:miter/>
         </a:ln>
         <a:ln w="19050" cap="flat" cmpd="sng" algn="ctr">
           <a:solidFill>
             <a:schemeClr val="phClr"/>
           </a:solidFill>
           <a:prstDash val="solid"/>
-          <a:miter lim="800000"/>
+          <a:miter/>
         </a:ln>
       </a:lnStyleLst>
       <a:effectStyleLst>
@@ -4173,12 +5459,5 @@
       </a:bgFillStyleLst>
     </a:fmtScheme>
   </a:themeElements>
-  <a:objectDefaults/>
-  <a:extraClrSchemeLst/>
-  <a:extLst>
-    <a:ext uri="{05A4C25C-085E-4340-85A3-A5531E510DB2}">
-      <thm15:themeFamily xmlns:thm15="http://schemas.microsoft.com/office/thememl/2012/main" name="Office Theme" id="{62F939B6-93AF-4DB8-9C6B-D6C7DFDC589F}" vid="{4A3C46E8-61CC-4603-A589-7422A47A8E4A}"/>
-    </a:ext>
-  </a:extLst>
 </a:theme>
 </file>
</xml_diff>